<commit_message>
Corrected speaker notes for C# console demonstration.
</commit_message>
<xml_diff>
--- a/Powerpoint/DDDNorth-EventStore.pptx
+++ b/Powerpoint/DDDNorth-EventStore.pptx
@@ -222,7 +222,7 @@
           <a:p>
             <a:fld id="{1D30D304-7667-4398-B622-91A56A0E2E60}" type="datetimeFigureOut">
               <a:rPr lang="en-GB" smtClean="0"/>
-              <a:t>12/10/2013</a:t>
+              <a:t>16/10/2013</a:t>
             </a:fld>
             <a:endParaRPr lang="en-GB"/>
           </a:p>
@@ -801,7 +801,24 @@
           <a:p>
             <a:r>
               <a:rPr lang="en-US" baseline="0" dirty="0" smtClean="0"/>
-              <a:t>C# project in Visual Studio 2010</a:t>
+              <a:t>C# project in Visual Studio </a:t>
+            </a:r>
+            <a:r>
+              <a:rPr lang="en-US" baseline="0" dirty="0" smtClean="0"/>
+              <a:t>2010</a:t>
+            </a:r>
+          </a:p>
+          <a:p>
+            <a:endParaRPr lang="en-US" baseline="0" dirty="0" smtClean="0"/>
+          </a:p>
+          <a:p>
+            <a:r>
+              <a:rPr lang="en-US" baseline="0" dirty="0" smtClean="0"/>
+              <a:t>Demonstrate getting projections using the projection manager, adding session information, and then recalling that session data in streams, including </a:t>
+            </a:r>
+            <a:r>
+              <a:rPr lang="en-US" baseline="0" smtClean="0"/>
+              <a:t>handling updates.</a:t>
             </a:r>
             <a:endParaRPr lang="en-GB" baseline="0" dirty="0" smtClean="0"/>
           </a:p>
@@ -949,20 +966,7 @@
                 <a:cs typeface="+mn-cs"/>
                 <a:hlinkClick r:id="rId4"/>
               </a:rPr>
-              <a:t>https://</a:t>
-            </a:r>
-            <a:r>
-              <a:rPr lang="en-GB" sz="1200" u="sng" kern="1200" dirty="0" smtClean="0">
-                <a:solidFill>
-                  <a:schemeClr val="tx1"/>
-                </a:solidFill>
-                <a:effectLst/>
-                <a:latin typeface="+mn-lt"/>
-                <a:ea typeface="+mn-ea"/>
-                <a:cs typeface="+mn-cs"/>
-                <a:hlinkClick r:id="rId4"/>
-              </a:rPr>
-              <a:t>gist.github.com/trbngr/5083266</a:t>
+              <a:t>https://gist.github.com/trbngr/5083266</a:t>
             </a:r>
             <a:endParaRPr lang="en-GB" b="0" baseline="0" dirty="0" smtClean="0"/>
           </a:p>
@@ -2148,281 +2152,197 @@
           <a:lstStyle/>
           <a:p>
             <a:r>
-              <a:rPr lang="en-GB" dirty="0" smtClean="0"/>
-              <a:t>In console – use</a:t>
-            </a:r>
-            <a:r>
               <a:rPr lang="en-GB" baseline="0" dirty="0" smtClean="0"/>
-              <a:t> curl to add a new event via a data file </a:t>
+              <a:t>Browse to the management console, http://127.0.0.1:2213.</a:t>
+            </a:r>
+          </a:p>
+          <a:p>
+            <a:endParaRPr lang="en-US" baseline="0" dirty="0" smtClean="0"/>
+          </a:p>
+          <a:p>
+            <a:r>
+              <a:rPr lang="en-GB" baseline="0" dirty="0" smtClean="0"/>
+              <a:t>Click on Projections, New Projection, give it a name, </a:t>
+            </a:r>
+            <a:r>
+              <a:rPr lang="en-GB" i="1" baseline="0" dirty="0" smtClean="0"/>
+              <a:t>Sessions-</a:t>
+            </a:r>
+            <a:r>
+              <a:rPr lang="en-GB" i="1" baseline="0" dirty="0" err="1" smtClean="0"/>
+              <a:t>ByRoom</a:t>
+            </a:r>
+            <a:r>
+              <a:rPr lang="en-GB" baseline="0" dirty="0" smtClean="0"/>
+              <a:t>, and copy in the JavaScript below.  </a:t>
+            </a:r>
+          </a:p>
+          <a:p>
+            <a:endParaRPr lang="en-US" baseline="0" dirty="0" smtClean="0"/>
+          </a:p>
+          <a:p>
+            <a:pPr lvl="1"/>
+            <a:r>
+              <a:rPr lang="en-GB" baseline="0" dirty="0" err="1" smtClean="0">
+                <a:latin typeface="Courier New" panose="02070309020205020404" pitchFamily="49" charset="0"/>
+                <a:cs typeface="Courier New" panose="02070309020205020404" pitchFamily="49" charset="0"/>
+              </a:rPr>
+              <a:t>fromStream</a:t>
+            </a:r>
+            <a:r>
+              <a:rPr lang="en-GB" baseline="0" dirty="0" smtClean="0">
+                <a:latin typeface="Courier New" panose="02070309020205020404" pitchFamily="49" charset="0"/>
+                <a:cs typeface="Courier New" panose="02070309020205020404" pitchFamily="49" charset="0"/>
+              </a:rPr>
+              <a:t>('DDDNorth3')</a:t>
+            </a:r>
+          </a:p>
+          <a:p>
+            <a:pPr lvl="1"/>
+            <a:r>
+              <a:rPr lang="en-GB" baseline="0" dirty="0" smtClean="0">
+                <a:latin typeface="Courier New" panose="02070309020205020404" pitchFamily="49" charset="0"/>
+                <a:cs typeface="Courier New" panose="02070309020205020404" pitchFamily="49" charset="0"/>
+              </a:rPr>
+              <a:t>    .when({</a:t>
+            </a:r>
+          </a:p>
+          <a:p>
+            <a:pPr lvl="1"/>
+            <a:r>
+              <a:rPr lang="en-GB" baseline="0" dirty="0" smtClean="0">
+                <a:latin typeface="Courier New" panose="02070309020205020404" pitchFamily="49" charset="0"/>
+                <a:cs typeface="Courier New" panose="02070309020205020404" pitchFamily="49" charset="0"/>
+              </a:rPr>
+              <a:t>        '$any': function (state, event) {</a:t>
+            </a:r>
+          </a:p>
+          <a:p>
+            <a:pPr lvl="1"/>
+            <a:r>
+              <a:rPr lang="en-GB" baseline="0" dirty="0" smtClean="0">
+                <a:latin typeface="Courier New" panose="02070309020205020404" pitchFamily="49" charset="0"/>
+                <a:cs typeface="Courier New" panose="02070309020205020404" pitchFamily="49" charset="0"/>
+              </a:rPr>
+              <a:t>            </a:t>
+            </a:r>
+            <a:r>
+              <a:rPr lang="en-GB" baseline="0" dirty="0" err="1" smtClean="0">
+                <a:latin typeface="Courier New" panose="02070309020205020404" pitchFamily="49" charset="0"/>
+                <a:cs typeface="Courier New" panose="02070309020205020404" pitchFamily="49" charset="0"/>
+              </a:rPr>
+              <a:t>var</a:t>
+            </a:r>
+            <a:r>
+              <a:rPr lang="en-GB" baseline="0" dirty="0" smtClean="0">
+                <a:latin typeface="Courier New" panose="02070309020205020404" pitchFamily="49" charset="0"/>
+                <a:cs typeface="Courier New" panose="02070309020205020404" pitchFamily="49" charset="0"/>
+              </a:rPr>
+              <a:t> </a:t>
+            </a:r>
+            <a:r>
+              <a:rPr lang="en-GB" baseline="0" dirty="0" err="1" smtClean="0">
+                <a:latin typeface="Courier New" panose="02070309020205020404" pitchFamily="49" charset="0"/>
+                <a:cs typeface="Courier New" panose="02070309020205020404" pitchFamily="49" charset="0"/>
+              </a:rPr>
+              <a:t>roomNumber</a:t>
+            </a:r>
+            <a:r>
+              <a:rPr lang="en-GB" baseline="0" dirty="0" smtClean="0">
+                <a:latin typeface="Courier New" panose="02070309020205020404" pitchFamily="49" charset="0"/>
+                <a:cs typeface="Courier New" panose="02070309020205020404" pitchFamily="49" charset="0"/>
+              </a:rPr>
+              <a:t> = </a:t>
+            </a:r>
+            <a:r>
+              <a:rPr lang="en-GB" baseline="0" dirty="0" err="1" smtClean="0">
+                <a:latin typeface="Courier New" panose="02070309020205020404" pitchFamily="49" charset="0"/>
+                <a:cs typeface="Courier New" panose="02070309020205020404" pitchFamily="49" charset="0"/>
+              </a:rPr>
+              <a:t>event.body</a:t>
+            </a:r>
+            <a:r>
+              <a:rPr lang="en-GB" baseline="0" dirty="0" smtClean="0">
+                <a:latin typeface="Courier New" panose="02070309020205020404" pitchFamily="49" charset="0"/>
+                <a:cs typeface="Courier New" panose="02070309020205020404" pitchFamily="49" charset="0"/>
+              </a:rPr>
+              <a:t>['room'];</a:t>
+            </a:r>
+          </a:p>
+          <a:p>
+            <a:pPr lvl="1"/>
+            <a:r>
+              <a:rPr lang="en-GB" baseline="0" dirty="0" smtClean="0">
+                <a:latin typeface="Courier New" panose="02070309020205020404" pitchFamily="49" charset="0"/>
+                <a:cs typeface="Courier New" panose="02070309020205020404" pitchFamily="49" charset="0"/>
+              </a:rPr>
+              <a:t>            </a:t>
+            </a:r>
+            <a:r>
+              <a:rPr lang="en-GB" baseline="0" dirty="0" err="1" smtClean="0">
+                <a:latin typeface="Courier New" panose="02070309020205020404" pitchFamily="49" charset="0"/>
+                <a:cs typeface="Courier New" panose="02070309020205020404" pitchFamily="49" charset="0"/>
+              </a:rPr>
+              <a:t>linkTo</a:t>
+            </a:r>
+            <a:r>
+              <a:rPr lang="en-GB" baseline="0" dirty="0" smtClean="0">
+                <a:latin typeface="Courier New" panose="02070309020205020404" pitchFamily="49" charset="0"/>
+                <a:cs typeface="Courier New" panose="02070309020205020404" pitchFamily="49" charset="0"/>
+              </a:rPr>
+              <a:t>('Room-' + </a:t>
+            </a:r>
+            <a:r>
+              <a:rPr lang="en-GB" baseline="0" dirty="0" err="1" smtClean="0">
+                <a:latin typeface="Courier New" panose="02070309020205020404" pitchFamily="49" charset="0"/>
+                <a:cs typeface="Courier New" panose="02070309020205020404" pitchFamily="49" charset="0"/>
+              </a:rPr>
+              <a:t>roomNumber</a:t>
+            </a:r>
+            <a:r>
+              <a:rPr lang="en-GB" baseline="0" dirty="0" smtClean="0">
+                <a:latin typeface="Courier New" panose="02070309020205020404" pitchFamily="49" charset="0"/>
+                <a:cs typeface="Courier New" panose="02070309020205020404" pitchFamily="49" charset="0"/>
+              </a:rPr>
+              <a:t>, event);</a:t>
+            </a:r>
+          </a:p>
+          <a:p>
+            <a:pPr lvl="1"/>
+            <a:r>
+              <a:rPr lang="en-GB" baseline="0" dirty="0" smtClean="0">
+                <a:latin typeface="Courier New" panose="02070309020205020404" pitchFamily="49" charset="0"/>
+                <a:cs typeface="Courier New" panose="02070309020205020404" pitchFamily="49" charset="0"/>
+              </a:rPr>
+              <a:t>        } </a:t>
+            </a:r>
+          </a:p>
+          <a:p>
+            <a:pPr lvl="1"/>
+            <a:r>
+              <a:rPr lang="en-GB" baseline="0" dirty="0" smtClean="0">
+                <a:latin typeface="Courier New" panose="02070309020205020404" pitchFamily="49" charset="0"/>
+                <a:cs typeface="Courier New" panose="02070309020205020404" pitchFamily="49" charset="0"/>
+              </a:rPr>
+              <a:t>    });</a:t>
+            </a:r>
+          </a:p>
+          <a:p>
+            <a:endParaRPr lang="en-GB" baseline="0" dirty="0" smtClean="0"/>
+          </a:p>
+          <a:p>
+            <a:r>
+              <a:rPr lang="en-GB" baseline="0" dirty="0" smtClean="0"/>
+              <a:t>Select Continuous, tick Emit Enabled and then click on Post.  It should run immediately.  You may by challenged for the administration login for the management console, 'admin'/'</a:t>
             </a:r>
             <a:r>
               <a:rPr lang="en-GB" baseline="0" dirty="0" err="1" smtClean="0"/>
-              <a:t>SampleData.json</a:t>
+              <a:t>changeit</a:t>
             </a:r>
             <a:r>
               <a:rPr lang="en-GB" baseline="0" dirty="0" smtClean="0"/>
-              <a:t>.</a:t>
-            </a:r>
-          </a:p>
-          <a:p>
-            <a:endParaRPr lang="en-GB" baseline="0" dirty="0" smtClean="0"/>
-          </a:p>
-          <a:p>
-            <a:r>
-              <a:rPr lang="en-GB" baseline="0" dirty="0" smtClean="0"/>
-              <a:t>	curl -</a:t>
-            </a:r>
-            <a:r>
-              <a:rPr lang="en-GB" baseline="0" dirty="0" err="1" smtClean="0"/>
-              <a:t>i</a:t>
-            </a:r>
-            <a:r>
-              <a:rPr lang="en-GB" baseline="0" dirty="0" smtClean="0"/>
-              <a:t> -u </a:t>
-            </a:r>
-            <a:r>
-              <a:rPr lang="en-GB" baseline="0" dirty="0" err="1" smtClean="0"/>
-              <a:t>admin:changeit</a:t>
-            </a:r>
-            <a:r>
-              <a:rPr lang="en-GB" baseline="0" dirty="0" smtClean="0"/>
-              <a:t> -d @</a:t>
-            </a:r>
-            <a:r>
-              <a:rPr lang="en-GB" baseline="0" dirty="0" err="1" smtClean="0"/>
-              <a:t>SampleEvent.json</a:t>
-            </a:r>
-            <a:r>
-              <a:rPr lang="en-GB" baseline="0" dirty="0" smtClean="0"/>
-              <a:t> -H "Content-Type: application/</a:t>
-            </a:r>
-            <a:r>
-              <a:rPr lang="en-GB" baseline="0" dirty="0" err="1" smtClean="0"/>
-              <a:t>json</a:t>
-            </a:r>
-            <a:r>
-              <a:rPr lang="en-GB" baseline="0" dirty="0" smtClean="0"/>
-              <a:t>" -X POST http://127.0.0.1:2213/streams/DDDNorth3</a:t>
-            </a:r>
-          </a:p>
-          <a:p>
-            <a:endParaRPr lang="en-GB" baseline="0" dirty="0" smtClean="0"/>
-          </a:p>
-          <a:p>
-            <a:r>
-              <a:rPr lang="en-GB" baseline="0" dirty="0" smtClean="0"/>
-              <a:t>Use </a:t>
-            </a:r>
-            <a:r>
-              <a:rPr lang="en-GB" baseline="0" dirty="0" err="1" smtClean="0"/>
-              <a:t>Guid</a:t>
-            </a:r>
-            <a:r>
-              <a:rPr lang="en-GB" baseline="0" dirty="0" smtClean="0"/>
-              <a:t> creation tool to create new events (you can’t have same GUID twice on Atom publishing).</a:t>
-            </a:r>
-          </a:p>
-          <a:p>
-            <a:endParaRPr lang="en-GB" baseline="0" dirty="0" smtClean="0"/>
-          </a:p>
-          <a:p>
-            <a:r>
-              <a:rPr lang="en-GB" baseline="0" dirty="0" smtClean="0"/>
-              <a:t>Get an entire stream, </a:t>
-            </a:r>
-          </a:p>
-          <a:p>
-            <a:endParaRPr lang="en-GB" baseline="0" dirty="0" smtClean="0"/>
-          </a:p>
-          <a:p>
-            <a:r>
-              <a:rPr lang="en-GB" baseline="0" dirty="0" smtClean="0"/>
-              <a:t>	curl -u </a:t>
-            </a:r>
-            <a:r>
-              <a:rPr lang="en-GB" baseline="0" dirty="0" err="1" smtClean="0"/>
-              <a:t>admin:changeit</a:t>
-            </a:r>
-            <a:r>
-              <a:rPr lang="en-GB" baseline="0" dirty="0" smtClean="0"/>
-              <a:t> -H "</a:t>
-            </a:r>
-            <a:r>
-              <a:rPr lang="en-GB" baseline="0" dirty="0" err="1" smtClean="0"/>
-              <a:t>Accept:application</a:t>
-            </a:r>
-            <a:r>
-              <a:rPr lang="en-GB" baseline="0" dirty="0" smtClean="0"/>
-              <a:t>/</a:t>
-            </a:r>
-            <a:r>
-              <a:rPr lang="en-GB" baseline="0" dirty="0" err="1" smtClean="0"/>
-              <a:t>json</a:t>
-            </a:r>
-            <a:r>
-              <a:rPr lang="en-GB" baseline="0" dirty="0" smtClean="0"/>
-              <a:t>" http://127.0.0.1:2213/streams/$stats-127.0.0.1:2113</a:t>
-            </a:r>
-          </a:p>
-          <a:p>
-            <a:pPr marL="0" marR="0" indent="0" algn="l" defTabSz="914400" rtl="0" eaLnBrk="1" fontAlgn="auto" latinLnBrk="0" hangingPunct="1">
-              <a:lnSpc>
-                <a:spcPct val="100000"/>
-              </a:lnSpc>
-              <a:spcBef>
-                <a:spcPts val="0"/>
-              </a:spcBef>
-              <a:spcAft>
-                <a:spcPts val="0"/>
-              </a:spcAft>
-              <a:buClrTx/>
-              <a:buSzTx/>
-              <a:buFontTx/>
-              <a:buNone/>
-              <a:tabLst/>
-              <a:defRPr/>
-            </a:pPr>
-            <a:endParaRPr lang="en-GB" baseline="0" dirty="0" smtClean="0"/>
-          </a:p>
-          <a:p>
-            <a:pPr marL="0" marR="0" indent="0" algn="l" defTabSz="914400" rtl="0" eaLnBrk="1" fontAlgn="auto" latinLnBrk="0" hangingPunct="1">
-              <a:lnSpc>
-                <a:spcPct val="100000"/>
-              </a:lnSpc>
-              <a:spcBef>
-                <a:spcPts val="0"/>
-              </a:spcBef>
-              <a:spcAft>
-                <a:spcPts val="0"/>
-              </a:spcAft>
-              <a:buClrTx/>
-              <a:buSzTx/>
-              <a:buFontTx/>
-              <a:buNone/>
-              <a:tabLst/>
-              <a:defRPr/>
-            </a:pPr>
-            <a:r>
-              <a:rPr lang="en-GB" baseline="0" dirty="0" smtClean="0"/>
-              <a:t>Get just the </a:t>
-            </a:r>
-            <a:r>
-              <a:rPr lang="en-GB" baseline="0" dirty="0" err="1" smtClean="0"/>
-              <a:t>lastest</a:t>
-            </a:r>
-            <a:r>
-              <a:rPr lang="en-GB" baseline="0" dirty="0" smtClean="0"/>
-              <a:t> event,</a:t>
-            </a:r>
-          </a:p>
-          <a:p>
-            <a:pPr marL="0" marR="0" indent="0" algn="l" defTabSz="914400" rtl="0" eaLnBrk="1" fontAlgn="auto" latinLnBrk="0" hangingPunct="1">
-              <a:lnSpc>
-                <a:spcPct val="100000"/>
-              </a:lnSpc>
-              <a:spcBef>
-                <a:spcPts val="0"/>
-              </a:spcBef>
-              <a:spcAft>
-                <a:spcPts val="0"/>
-              </a:spcAft>
-              <a:buClrTx/>
-              <a:buSzTx/>
-              <a:buFontTx/>
-              <a:buNone/>
-              <a:tabLst/>
-              <a:defRPr/>
-            </a:pPr>
-            <a:endParaRPr lang="en-GB" baseline="0" dirty="0" smtClean="0"/>
-          </a:p>
-          <a:p>
-            <a:pPr marL="0" marR="0" indent="0" algn="l" defTabSz="914400" rtl="0" eaLnBrk="1" fontAlgn="auto" latinLnBrk="0" hangingPunct="1">
-              <a:lnSpc>
-                <a:spcPct val="100000"/>
-              </a:lnSpc>
-              <a:spcBef>
-                <a:spcPts val="0"/>
-              </a:spcBef>
-              <a:spcAft>
-                <a:spcPts val="0"/>
-              </a:spcAft>
-              <a:buClrTx/>
-              <a:buSzTx/>
-              <a:buFontTx/>
-              <a:buNone/>
-              <a:tabLst/>
-              <a:defRPr/>
-            </a:pPr>
-            <a:r>
-              <a:rPr lang="en-GB" baseline="0" dirty="0" smtClean="0"/>
-              <a:t>	curl -u </a:t>
-            </a:r>
-            <a:r>
-              <a:rPr lang="en-GB" baseline="0" dirty="0" err="1" smtClean="0"/>
-              <a:t>admin:changeit</a:t>
-            </a:r>
-            <a:r>
-              <a:rPr lang="en-GB" baseline="0" dirty="0" smtClean="0"/>
-              <a:t> -H "</a:t>
-            </a:r>
-            <a:r>
-              <a:rPr lang="en-GB" baseline="0" dirty="0" err="1" smtClean="0"/>
-              <a:t>Accept:application</a:t>
-            </a:r>
-            <a:r>
-              <a:rPr lang="en-GB" baseline="0" dirty="0" smtClean="0"/>
-              <a:t>/</a:t>
-            </a:r>
-            <a:r>
-              <a:rPr lang="en-GB" baseline="0" dirty="0" err="1" smtClean="0"/>
-              <a:t>json</a:t>
-            </a:r>
-            <a:r>
-              <a:rPr lang="en-GB" baseline="0" dirty="0" smtClean="0"/>
-              <a:t>" http://127.0.0.1:2213/streams/$stats-127.0.0.1:2113/head/backward/1</a:t>
-            </a:r>
-          </a:p>
-          <a:p>
-            <a:pPr marL="0" marR="0" indent="0" algn="l" defTabSz="914400" rtl="0" eaLnBrk="1" fontAlgn="auto" latinLnBrk="0" hangingPunct="1">
-              <a:lnSpc>
-                <a:spcPct val="100000"/>
-              </a:lnSpc>
-              <a:spcBef>
-                <a:spcPts val="0"/>
-              </a:spcBef>
-              <a:spcAft>
-                <a:spcPts val="0"/>
-              </a:spcAft>
-              <a:buClrTx/>
-              <a:buSzTx/>
-              <a:buFontTx/>
-              <a:buNone/>
-              <a:tabLst/>
-              <a:defRPr/>
-            </a:pPr>
-            <a:endParaRPr lang="en-GB" baseline="0" dirty="0" smtClean="0"/>
-          </a:p>
-          <a:p>
-            <a:pPr marL="0" marR="0" indent="0" algn="l" defTabSz="914400" rtl="0" eaLnBrk="1" fontAlgn="auto" latinLnBrk="0" hangingPunct="1">
-              <a:lnSpc>
-                <a:spcPct val="100000"/>
-              </a:lnSpc>
-              <a:spcBef>
-                <a:spcPts val="0"/>
-              </a:spcBef>
-              <a:spcAft>
-                <a:spcPts val="0"/>
-              </a:spcAft>
-              <a:buClrTx/>
-              <a:buSzTx/>
-              <a:buFontTx/>
-              <a:buNone/>
-              <a:tabLst/>
-              <a:defRPr/>
-            </a:pPr>
-            <a:endParaRPr lang="en-GB" baseline="0" dirty="0" smtClean="0"/>
-          </a:p>
-          <a:p>
+              <a:t>'.</a:t>
+            </a:r>
             <a:endParaRPr lang="en-GB" baseline="0" dirty="0" smtClean="0"/>
           </a:p>
         </p:txBody>
@@ -2644,7 +2564,7 @@
           <a:p>
             <a:fld id="{062C35B2-88CA-49D3-8E4A-1D75786B8009}" type="datetimeFigureOut">
               <a:rPr lang="en-GB" smtClean="0"/>
-              <a:t>12/10/2013</a:t>
+              <a:t>16/10/2013</a:t>
             </a:fld>
             <a:endParaRPr lang="en-GB"/>
           </a:p>
@@ -2814,7 +2734,7 @@
           <a:p>
             <a:fld id="{062C35B2-88CA-49D3-8E4A-1D75786B8009}" type="datetimeFigureOut">
               <a:rPr lang="en-GB" smtClean="0"/>
-              <a:t>12/10/2013</a:t>
+              <a:t>16/10/2013</a:t>
             </a:fld>
             <a:endParaRPr lang="en-GB"/>
           </a:p>
@@ -2994,7 +2914,7 @@
           <a:p>
             <a:fld id="{062C35B2-88CA-49D3-8E4A-1D75786B8009}" type="datetimeFigureOut">
               <a:rPr lang="en-GB" smtClean="0"/>
-              <a:t>12/10/2013</a:t>
+              <a:t>16/10/2013</a:t>
             </a:fld>
             <a:endParaRPr lang="en-GB"/>
           </a:p>
@@ -3164,7 +3084,7 @@
           <a:p>
             <a:fld id="{062C35B2-88CA-49D3-8E4A-1D75786B8009}" type="datetimeFigureOut">
               <a:rPr lang="en-GB" smtClean="0"/>
-              <a:t>12/10/2013</a:t>
+              <a:t>16/10/2013</a:t>
             </a:fld>
             <a:endParaRPr lang="en-GB"/>
           </a:p>
@@ -3410,7 +3330,7 @@
           <a:p>
             <a:fld id="{062C35B2-88CA-49D3-8E4A-1D75786B8009}" type="datetimeFigureOut">
               <a:rPr lang="en-GB" smtClean="0"/>
-              <a:t>12/10/2013</a:t>
+              <a:t>16/10/2013</a:t>
             </a:fld>
             <a:endParaRPr lang="en-GB"/>
           </a:p>
@@ -3698,7 +3618,7 @@
           <a:p>
             <a:fld id="{062C35B2-88CA-49D3-8E4A-1D75786B8009}" type="datetimeFigureOut">
               <a:rPr lang="en-GB" smtClean="0"/>
-              <a:t>12/10/2013</a:t>
+              <a:t>16/10/2013</a:t>
             </a:fld>
             <a:endParaRPr lang="en-GB"/>
           </a:p>
@@ -4120,7 +4040,7 @@
           <a:p>
             <a:fld id="{062C35B2-88CA-49D3-8E4A-1D75786B8009}" type="datetimeFigureOut">
               <a:rPr lang="en-GB" smtClean="0"/>
-              <a:t>12/10/2013</a:t>
+              <a:t>16/10/2013</a:t>
             </a:fld>
             <a:endParaRPr lang="en-GB"/>
           </a:p>
@@ -4238,7 +4158,7 @@
           <a:p>
             <a:fld id="{062C35B2-88CA-49D3-8E4A-1D75786B8009}" type="datetimeFigureOut">
               <a:rPr lang="en-GB" smtClean="0"/>
-              <a:t>12/10/2013</a:t>
+              <a:t>16/10/2013</a:t>
             </a:fld>
             <a:endParaRPr lang="en-GB"/>
           </a:p>
@@ -4333,7 +4253,7 @@
           <a:p>
             <a:fld id="{062C35B2-88CA-49D3-8E4A-1D75786B8009}" type="datetimeFigureOut">
               <a:rPr lang="en-GB" smtClean="0"/>
-              <a:t>12/10/2013</a:t>
+              <a:t>16/10/2013</a:t>
             </a:fld>
             <a:endParaRPr lang="en-GB"/>
           </a:p>
@@ -4610,7 +4530,7 @@
           <a:p>
             <a:fld id="{062C35B2-88CA-49D3-8E4A-1D75786B8009}" type="datetimeFigureOut">
               <a:rPr lang="en-GB" smtClean="0"/>
-              <a:t>12/10/2013</a:t>
+              <a:t>16/10/2013</a:t>
             </a:fld>
             <a:endParaRPr lang="en-GB"/>
           </a:p>
@@ -4863,7 +4783,7 @@
           <a:p>
             <a:fld id="{062C35B2-88CA-49D3-8E4A-1D75786B8009}" type="datetimeFigureOut">
               <a:rPr lang="en-GB" smtClean="0"/>
-              <a:t>12/10/2013</a:t>
+              <a:t>16/10/2013</a:t>
             </a:fld>
             <a:endParaRPr lang="en-GB"/>
           </a:p>
@@ -5086,7 +5006,7 @@
             <a:fld id="{062C35B2-88CA-49D3-8E4A-1D75786B8009}" type="datetimeFigureOut">
               <a:rPr lang="en-GB" smtClean="0"/>
               <a:pPr/>
-              <a:t>12/10/2013</a:t>
+              <a:t>16/10/2013</a:t>
             </a:fld>
             <a:endParaRPr lang="en-GB" dirty="0"/>
           </a:p>
@@ -5500,11 +5420,6 @@
               </a:rPr>
               <a:t> </a:t>
             </a:r>
-            <a:endParaRPr lang="en-GB" dirty="0" smtClean="0">
-              <a:solidFill>
-                <a:srgbClr val="609104"/>
-              </a:solidFill>
-            </a:endParaRPr>
           </a:p>
           <a:p>
             <a:pPr marL="1257300" indent="-361950" algn="l">
@@ -5541,11 +5456,6 @@
               </a:rPr>
               <a:t>essage queuing</a:t>
             </a:r>
-            <a:endParaRPr lang="en-GB" dirty="0" smtClean="0">
-              <a:solidFill>
-                <a:srgbClr val="609104"/>
-              </a:solidFill>
-            </a:endParaRPr>
           </a:p>
           <a:p>
             <a:pPr marL="1257300" indent="-361950" algn="l">
@@ -5566,15 +5476,7 @@
                   <a:srgbClr val="609104"/>
                 </a:solidFill>
               </a:rPr>
-              <a:t>toring </a:t>
-            </a:r>
-            <a:r>
-              <a:rPr lang="en-GB" dirty="0" smtClean="0">
-                <a:solidFill>
-                  <a:srgbClr val="609104"/>
-                </a:solidFill>
-              </a:rPr>
-              <a:t>events and notifications</a:t>
+              <a:t>toring events and notifications</a:t>
             </a:r>
           </a:p>
           <a:p>
@@ -5596,15 +5498,7 @@
                   <a:srgbClr val="609104"/>
                 </a:solidFill>
               </a:rPr>
-              <a:t>uditing </a:t>
-            </a:r>
-            <a:r>
-              <a:rPr lang="en-GB" dirty="0" smtClean="0">
-                <a:solidFill>
-                  <a:srgbClr val="609104"/>
-                </a:solidFill>
-              </a:rPr>
-              <a:t>and archiving</a:t>
+              <a:t>uditing and archiving</a:t>
             </a:r>
             <a:endParaRPr lang="en-GB" dirty="0">
               <a:solidFill>
@@ -6296,24 +6190,15 @@
             </a:r>
             <a:r>
               <a:rPr lang="en-GB" dirty="0" err="1" smtClean="0"/>
-              <a:t>Ja</a:t>
-            </a:r>
-            <a:r>
-              <a:rPr lang="en-GB" dirty="0" err="1" smtClean="0"/>
-              <a:t>vascript</a:t>
+              <a:t>Javascript</a:t>
             </a:r>
             <a:endParaRPr lang="en-GB" dirty="0" smtClean="0"/>
           </a:p>
           <a:p>
             <a:r>
               <a:rPr lang="en-GB" dirty="0" smtClean="0"/>
-              <a:t>Filter specific streams, and are able to interrogate the event body </a:t>
-            </a:r>
-            <a:r>
-              <a:rPr lang="en-GB" dirty="0" smtClean="0"/>
-              <a:t>or metadata</a:t>
-            </a:r>
-            <a:endParaRPr lang="en-GB" dirty="0" smtClean="0"/>
+              <a:t>Filter specific streams, and are able to interrogate the event body or metadata</a:t>
+            </a:r>
           </a:p>
           <a:p>
             <a:r>
@@ -6343,13 +6228,8 @@
           <a:p>
             <a:r>
               <a:rPr lang="en-GB" dirty="0" smtClean="0"/>
-              <a:t>Can maintain </a:t>
-            </a:r>
-            <a:r>
-              <a:rPr lang="en-GB" dirty="0" smtClean="0"/>
-              <a:t>state on a stream</a:t>
-            </a:r>
-            <a:endParaRPr lang="en-GB" dirty="0" smtClean="0"/>
+              <a:t>Can maintain state on a stream</a:t>
+            </a:r>
           </a:p>
           <a:p>
             <a:endParaRPr lang="en-GB" dirty="0"/>
@@ -7309,11 +7189,7 @@
           <a:p>
             <a:r>
               <a:rPr lang="en-US" dirty="0" smtClean="0"/>
-              <a:t>XCOPY </a:t>
-            </a:r>
-            <a:r>
-              <a:rPr lang="en-US" dirty="0" smtClean="0"/>
-              <a:t>backup for database, trivial to script</a:t>
+              <a:t>XCOPY backup for database, trivial to script</a:t>
             </a:r>
           </a:p>
           <a:p>
@@ -7339,11 +7215,7 @@
           <a:p>
             <a:r>
               <a:rPr lang="en-US" dirty="0" smtClean="0"/>
-              <a:t>Source </a:t>
-            </a:r>
-            <a:r>
-              <a:rPr lang="en-US" dirty="0" smtClean="0"/>
-              <a:t>on </a:t>
+              <a:t>Source on </a:t>
             </a:r>
             <a:r>
               <a:rPr lang="en-US" dirty="0" err="1" smtClean="0"/>
@@ -7351,11 +7223,7 @@
             </a:r>
             <a:r>
               <a:rPr lang="en-US" dirty="0" smtClean="0"/>
-              <a:t> </a:t>
-            </a:r>
-            <a:r>
-              <a:rPr lang="en-US" dirty="0" smtClean="0"/>
-              <a:t>and supported via Google Groups</a:t>
+              <a:t> and supported via Google Groups</a:t>
             </a:r>
           </a:p>
           <a:p>
@@ -7398,10 +7266,9 @@
               <a:t>robashton</a:t>
             </a:r>
             <a:r>
-              <a:rPr lang="en-US" smtClean="0"/>
+              <a:rPr lang="en-US" dirty="0" smtClean="0"/>
               <a:t> blogs</a:t>
             </a:r>
-            <a:endParaRPr lang="en-US" dirty="0" smtClean="0"/>
           </a:p>
           <a:p>
             <a:endParaRPr lang="en-GB" dirty="0"/>
@@ -9092,11 +8959,7 @@
           <a:p>
             <a:r>
               <a:rPr lang="en-GB" dirty="0" smtClean="0"/>
-              <a:t>Brave New </a:t>
-            </a:r>
-            <a:r>
-              <a:rPr lang="en-GB" dirty="0" smtClean="0"/>
-              <a:t>World</a:t>
+              <a:t>Brave New World</a:t>
             </a:r>
             <a:endParaRPr lang="en-GB" dirty="0"/>
           </a:p>
@@ -9172,13 +9035,8 @@
           <a:p>
             <a:r>
               <a:rPr lang="en-GB" dirty="0" smtClean="0"/>
-              <a:t>Metadata can be as important as the </a:t>
-            </a:r>
-            <a:r>
-              <a:rPr lang="en-GB" dirty="0" smtClean="0"/>
-              <a:t>object data itself – not just versioning</a:t>
-            </a:r>
-            <a:endParaRPr lang="en-GB" dirty="0" smtClean="0"/>
+              <a:t>Metadata can be as important as the object data itself – not just versioning</a:t>
+            </a:r>
           </a:p>
           <a:p>
             <a:endParaRPr lang="en-GB" dirty="0" smtClean="0"/>
@@ -9959,15 +9817,7 @@
           <a:p>
             <a:r>
               <a:rPr lang="en-GB" dirty="0" smtClean="0"/>
-              <a:t>REST / </a:t>
-            </a:r>
-            <a:r>
-              <a:rPr lang="en-GB" dirty="0" smtClean="0"/>
-              <a:t>HTTP / TCP </a:t>
-            </a:r>
-            <a:r>
-              <a:rPr lang="en-GB" dirty="0" smtClean="0"/>
-              <a:t>interfaces</a:t>
+              <a:t>REST / HTTP / TCP interfaces</a:t>
             </a:r>
           </a:p>
           <a:p>
@@ -9978,11 +9828,7 @@
             </a:r>
             <a:r>
               <a:rPr lang="en-GB" dirty="0" smtClean="0"/>
-              <a:t> </a:t>
-            </a:r>
-            <a:r>
-              <a:rPr lang="en-GB" dirty="0" smtClean="0"/>
-              <a:t>format</a:t>
+              <a:t> format</a:t>
             </a:r>
           </a:p>
           <a:p>
@@ -9995,26 +9841,12 @@
               <a:rPr lang="en-GB" dirty="0" smtClean="0"/>
               <a:t>)</a:t>
             </a:r>
-            <a:endParaRPr lang="en-GB" dirty="0" smtClean="0"/>
           </a:p>
           <a:p>
             <a:r>
               <a:rPr lang="en-GB" dirty="0" smtClean="0"/>
-              <a:t>Auto </a:t>
-            </a:r>
-            <a:r>
-              <a:rPr lang="en-GB" dirty="0" smtClean="0"/>
-              <a:t>versioning; CQRS </a:t>
-            </a:r>
-            <a:r>
-              <a:rPr lang="en-GB" dirty="0" smtClean="0"/>
-              <a:t>and </a:t>
-            </a:r>
-            <a:r>
-              <a:rPr lang="en-GB" dirty="0" smtClean="0"/>
-              <a:t>message queuing</a:t>
-            </a:r>
-            <a:endParaRPr lang="en-GB" dirty="0" smtClean="0"/>
+              <a:t>Auto versioning; CQRS and message queuing</a:t>
+            </a:r>
           </a:p>
           <a:p>
             <a:r>
@@ -10023,13 +9855,8 @@
             </a:r>
             <a:r>
               <a:rPr lang="en-GB" dirty="0" smtClean="0"/>
-              <a:t> projections provide </a:t>
-            </a:r>
-            <a:r>
-              <a:rPr lang="en-GB" dirty="0" smtClean="0"/>
-              <a:t>a very flexible alternative to indices</a:t>
-            </a:r>
-            <a:endParaRPr lang="en-GB" dirty="0" smtClean="0"/>
+              <a:t> projections provide a very flexible alternative to indices</a:t>
+            </a:r>
           </a:p>
           <a:p>
             <a:endParaRPr lang="en-GB" dirty="0"/>
@@ -11149,11 +10976,7 @@
           <a:p>
             <a:r>
               <a:rPr lang="en-GB" dirty="0" smtClean="0"/>
-              <a:t>Read latest(s) event </a:t>
-            </a:r>
-            <a:r>
-              <a:rPr lang="en-GB" dirty="0" smtClean="0"/>
-              <a:t>published</a:t>
+              <a:t>Read latest(s) event published</a:t>
             </a:r>
           </a:p>
           <a:p>

</xml_diff>